<commit_message>
Añadimos nueva funcionalidad de Hibernate
</commit_message>
<xml_diff>
--- a/Unidad 3- Anotaciones en Spring.pptx
+++ b/Unidad 3- Anotaciones en Spring.pptx
@@ -207,7 +207,7 @@
           <a:p>
             <a:fld id="{C5E4E8B3-BC3D-4B17-AD72-6EEF0757A344}" type="datetimeFigureOut">
               <a:rPr lang="es-ES" smtClean="0"/>
-              <a:t>27/12/2023</a:t>
+              <a:t>15/01/2024</a:t>
             </a:fld>
             <a:endParaRPr lang="es-ES"/>
           </a:p>
@@ -1647,7 +1647,7 @@
           <a:p>
             <a:fld id="{CD7214D7-428D-4601-A337-8B3EF9271EE1}" type="datetimeFigureOut">
               <a:rPr lang="es-ES" smtClean="0"/>
-              <a:t>27/12/2023</a:t>
+              <a:t>15/01/2024</a:t>
             </a:fld>
             <a:endParaRPr lang="es-ES"/>
           </a:p>
@@ -1938,7 +1938,7 @@
           <a:p>
             <a:fld id="{CD7214D7-428D-4601-A337-8B3EF9271EE1}" type="datetimeFigureOut">
               <a:rPr lang="es-ES" smtClean="0"/>
-              <a:t>27/12/2023</a:t>
+              <a:t>15/01/2024</a:t>
             </a:fld>
             <a:endParaRPr lang="es-ES"/>
           </a:p>
@@ -2197,7 +2197,7 @@
           <a:p>
             <a:fld id="{CD7214D7-428D-4601-A337-8B3EF9271EE1}" type="datetimeFigureOut">
               <a:rPr lang="es-ES" smtClean="0"/>
-              <a:t>27/12/2023</a:t>
+              <a:t>15/01/2024</a:t>
             </a:fld>
             <a:endParaRPr lang="es-ES"/>
           </a:p>
@@ -2666,7 +2666,7 @@
           <a:p>
             <a:fld id="{CD7214D7-428D-4601-A337-8B3EF9271EE1}" type="datetimeFigureOut">
               <a:rPr lang="es-ES" smtClean="0"/>
-              <a:t>27/12/2023</a:t>
+              <a:t>15/01/2024</a:t>
             </a:fld>
             <a:endParaRPr lang="es-ES"/>
           </a:p>
@@ -2846,7 +2846,7 @@
           <a:p>
             <a:fld id="{CD7214D7-428D-4601-A337-8B3EF9271EE1}" type="datetimeFigureOut">
               <a:rPr lang="es-ES" smtClean="0"/>
-              <a:t>27/12/2023</a:t>
+              <a:t>15/01/2024</a:t>
             </a:fld>
             <a:endParaRPr lang="es-ES"/>
           </a:p>
@@ -3422,7 +3422,7 @@
           <a:p>
             <a:fld id="{CD7214D7-428D-4601-A337-8B3EF9271EE1}" type="datetimeFigureOut">
               <a:rPr lang="es-ES" smtClean="0"/>
-              <a:t>27/12/2023</a:t>
+              <a:t>15/01/2024</a:t>
             </a:fld>
             <a:endParaRPr lang="es-ES"/>
           </a:p>
@@ -3754,7 +3754,7 @@
           <a:p>
             <a:fld id="{CD7214D7-428D-4601-A337-8B3EF9271EE1}" type="datetimeFigureOut">
               <a:rPr lang="es-ES" smtClean="0"/>
-              <a:t>27/12/2023</a:t>
+              <a:t>15/01/2024</a:t>
             </a:fld>
             <a:endParaRPr lang="es-ES"/>
           </a:p>
@@ -3929,7 +3929,7 @@
           <a:p>
             <a:fld id="{CD7214D7-428D-4601-A337-8B3EF9271EE1}" type="datetimeFigureOut">
               <a:rPr lang="es-ES" smtClean="0"/>
-              <a:t>27/12/2023</a:t>
+              <a:t>15/01/2024</a:t>
             </a:fld>
             <a:endParaRPr lang="es-ES"/>
           </a:p>
@@ -4109,7 +4109,7 @@
           <a:p>
             <a:fld id="{CD7214D7-428D-4601-A337-8B3EF9271EE1}" type="datetimeFigureOut">
               <a:rPr lang="es-ES" smtClean="0"/>
-              <a:t>27/12/2023</a:t>
+              <a:t>15/01/2024</a:t>
             </a:fld>
             <a:endParaRPr lang="es-ES"/>
           </a:p>
@@ -4279,7 +4279,7 @@
           <a:p>
             <a:fld id="{CD7214D7-428D-4601-A337-8B3EF9271EE1}" type="datetimeFigureOut">
               <a:rPr lang="es-ES" smtClean="0"/>
-              <a:t>27/12/2023</a:t>
+              <a:t>15/01/2024</a:t>
             </a:fld>
             <a:endParaRPr lang="es-ES"/>
           </a:p>
@@ -4536,7 +4536,7 @@
           <a:p>
             <a:fld id="{CD7214D7-428D-4601-A337-8B3EF9271EE1}" type="datetimeFigureOut">
               <a:rPr lang="es-ES" smtClean="0"/>
-              <a:t>27/12/2023</a:t>
+              <a:t>15/01/2024</a:t>
             </a:fld>
             <a:endParaRPr lang="es-ES"/>
           </a:p>
@@ -4828,7 +4828,7 @@
           <a:p>
             <a:fld id="{CD7214D7-428D-4601-A337-8B3EF9271EE1}" type="datetimeFigureOut">
               <a:rPr lang="es-ES" smtClean="0"/>
-              <a:t>27/12/2023</a:t>
+              <a:t>15/01/2024</a:t>
             </a:fld>
             <a:endParaRPr lang="es-ES"/>
           </a:p>
@@ -5258,7 +5258,7 @@
           <a:p>
             <a:fld id="{CD7214D7-428D-4601-A337-8B3EF9271EE1}" type="datetimeFigureOut">
               <a:rPr lang="es-ES" smtClean="0"/>
-              <a:t>27/12/2023</a:t>
+              <a:t>15/01/2024</a:t>
             </a:fld>
             <a:endParaRPr lang="es-ES"/>
           </a:p>
@@ -5376,7 +5376,7 @@
           <a:p>
             <a:fld id="{CD7214D7-428D-4601-A337-8B3EF9271EE1}" type="datetimeFigureOut">
               <a:rPr lang="es-ES" smtClean="0"/>
-              <a:t>27/12/2023</a:t>
+              <a:t>15/01/2024</a:t>
             </a:fld>
             <a:endParaRPr lang="es-ES"/>
           </a:p>
@@ -5471,7 +5471,7 @@
           <a:p>
             <a:fld id="{CD7214D7-428D-4601-A337-8B3EF9271EE1}" type="datetimeFigureOut">
               <a:rPr lang="es-ES" smtClean="0"/>
-              <a:t>27/12/2023</a:t>
+              <a:t>15/01/2024</a:t>
             </a:fld>
             <a:endParaRPr lang="es-ES"/>
           </a:p>
@@ -5754,7 +5754,7 @@
           <a:p>
             <a:fld id="{CD7214D7-428D-4601-A337-8B3EF9271EE1}" type="datetimeFigureOut">
               <a:rPr lang="es-ES" smtClean="0"/>
-              <a:t>27/12/2023</a:t>
+              <a:t>15/01/2024</a:t>
             </a:fld>
             <a:endParaRPr lang="es-ES"/>
           </a:p>
@@ -6045,7 +6045,7 @@
           <a:p>
             <a:fld id="{CD7214D7-428D-4601-A337-8B3EF9271EE1}" type="datetimeFigureOut">
               <a:rPr lang="es-ES" smtClean="0"/>
-              <a:t>27/12/2023</a:t>
+              <a:t>15/01/2024</a:t>
             </a:fld>
             <a:endParaRPr lang="es-ES"/>
           </a:p>
@@ -6276,7 +6276,7 @@
           <a:p>
             <a:fld id="{CD7214D7-428D-4601-A337-8B3EF9271EE1}" type="datetimeFigureOut">
               <a:rPr lang="es-ES" smtClean="0"/>
-              <a:t>27/12/2023</a:t>
+              <a:t>15/01/2024</a:t>
             </a:fld>
             <a:endParaRPr lang="es-ES"/>
           </a:p>

</xml_diff>